<commit_message>
created new exc summary page
</commit_message>
<xml_diff>
--- a/3.Designs/Wireframe Deck.pptx
+++ b/3.Designs/Wireframe Deck.pptx
@@ -5,13 +5,14 @@
     <p:sldMasterId id="2147483648" r:id="rId1"/>
   </p:sldMasterIdLst>
   <p:notesMasterIdLst>
-    <p:notesMasterId r:id="rId6"/>
+    <p:notesMasterId r:id="rId7"/>
   </p:notesMasterIdLst>
   <p:sldIdLst>
     <p:sldId id="256" r:id="rId2"/>
-    <p:sldId id="257" r:id="rId3"/>
-    <p:sldId id="258" r:id="rId4"/>
-    <p:sldId id="259" r:id="rId5"/>
+    <p:sldId id="260" r:id="rId3"/>
+    <p:sldId id="257" r:id="rId4"/>
+    <p:sldId id="258" r:id="rId5"/>
+    <p:sldId id="259" r:id="rId6"/>
   </p:sldIdLst>
   <p:sldSz cx="12192000" cy="6858000"/>
   <p:notesSz cx="6858000" cy="9144000"/>
@@ -110,6 +111,11 @@
       </a:defRPr>
     </a:lvl9pPr>
   </p:defaultTextStyle>
+  <p:extLst>
+    <p:ext uri="{EFAFB233-063F-42B5-8137-9DF3F51BA10A}">
+      <p15:sldGuideLst xmlns:p15="http://schemas.microsoft.com/office/powerpoint/2012/main"/>
+    </p:ext>
+  </p:extLst>
 </p:presentation>
 </file>
 
@@ -570,6 +576,129 @@
         <p:cNvPr id="1" name="">
           <a:extLst>
             <a:ext uri="{FF2B5EF4-FFF2-40B4-BE49-F238E27FC236}">
+              <a16:creationId xmlns:a16="http://schemas.microsoft.com/office/drawing/2014/main" id="{3B7BB1AD-8D55-3F76-D6EF-6969494CB1A5}"/>
+            </a:ext>
+          </a:extLst>
+        </p:cNvPr>
+        <p:cNvGrpSpPr/>
+        <p:nvPr/>
+      </p:nvGrpSpPr>
+      <p:grpSpPr>
+        <a:xfrm>
+          <a:off x="0" y="0"/>
+          <a:ext cx="0" cy="0"/>
+          <a:chOff x="0" y="0"/>
+          <a:chExt cx="0" cy="0"/>
+        </a:xfrm>
+      </p:grpSpPr>
+      <p:sp>
+        <p:nvSpPr>
+          <p:cNvPr id="2" name="Slide Image Placeholder 1">
+            <a:extLst>
+              <a:ext uri="{FF2B5EF4-FFF2-40B4-BE49-F238E27FC236}">
+                <a16:creationId xmlns:a16="http://schemas.microsoft.com/office/drawing/2014/main" id="{A4072DDE-0B36-8525-2688-D4099F01568A}"/>
+              </a:ext>
+            </a:extLst>
+          </p:cNvPr>
+          <p:cNvSpPr>
+            <a:spLocks noGrp="1" noRot="1" noChangeAspect="1"/>
+          </p:cNvSpPr>
+          <p:nvPr>
+            <p:ph type="sldImg"/>
+          </p:nvPr>
+        </p:nvSpPr>
+        <p:spPr/>
+      </p:sp>
+      <p:sp>
+        <p:nvSpPr>
+          <p:cNvPr id="3" name="Notes Placeholder 2">
+            <a:extLst>
+              <a:ext uri="{FF2B5EF4-FFF2-40B4-BE49-F238E27FC236}">
+                <a16:creationId xmlns:a16="http://schemas.microsoft.com/office/drawing/2014/main" id="{191BC97A-7165-CBA2-FB8B-27B93FFB26C0}"/>
+              </a:ext>
+            </a:extLst>
+          </p:cNvPr>
+          <p:cNvSpPr>
+            <a:spLocks noGrp="1"/>
+          </p:cNvSpPr>
+          <p:nvPr>
+            <p:ph type="body" idx="1"/>
+          </p:nvPr>
+        </p:nvSpPr>
+        <p:spPr/>
+        <p:txBody>
+          <a:bodyPr/>
+          <a:lstStyle/>
+          <a:p>
+            <a:r>
+              <a:rPr lang="en-IN" dirty="0"/>
+              <a:t>#094780 -Blue colour</a:t>
+            </a:r>
+          </a:p>
+          <a:p>
+            <a:r>
+              <a:rPr lang="en-IN" dirty="0"/>
+              <a:t>#C7B8E7 – light grey #E6E6E6   b5c8d7 e2f4ed</a:t>
+            </a:r>
+          </a:p>
+          <a:p>
+            <a:r>
+              <a:rPr lang="en-IN" dirty="0"/>
+              <a:t>#118DFF – light blue</a:t>
+            </a:r>
+          </a:p>
+        </p:txBody>
+      </p:sp>
+      <p:sp>
+        <p:nvSpPr>
+          <p:cNvPr id="4" name="Slide Number Placeholder 3">
+            <a:extLst>
+              <a:ext uri="{FF2B5EF4-FFF2-40B4-BE49-F238E27FC236}">
+                <a16:creationId xmlns:a16="http://schemas.microsoft.com/office/drawing/2014/main" id="{36894E0C-9C17-003F-A635-CB034119467A}"/>
+              </a:ext>
+            </a:extLst>
+          </p:cNvPr>
+          <p:cNvSpPr>
+            <a:spLocks noGrp="1"/>
+          </p:cNvSpPr>
+          <p:nvPr>
+            <p:ph type="sldNum" sz="quarter" idx="5"/>
+          </p:nvPr>
+        </p:nvSpPr>
+        <p:spPr/>
+        <p:txBody>
+          <a:bodyPr/>
+          <a:lstStyle/>
+          <a:p>
+            <a:fld id="{4F964865-31C0-4E3C-A8A6-F3E1FD66824B}" type="slidenum">
+              <a:rPr lang="en-IN" smtClean="0"/>
+              <a:t>2</a:t>
+            </a:fld>
+            <a:endParaRPr lang="en-IN"/>
+          </a:p>
+        </p:txBody>
+      </p:sp>
+    </p:spTree>
+    <p:extLst>
+      <p:ext uri="{BB962C8B-B14F-4D97-AF65-F5344CB8AC3E}">
+        <p14:creationId xmlns:p14="http://schemas.microsoft.com/office/powerpoint/2010/main" val="1280462209"/>
+      </p:ext>
+    </p:extLst>
+  </p:cSld>
+  <p:clrMapOvr>
+    <a:masterClrMapping/>
+  </p:clrMapOvr>
+</p:notes>
+</file>
+
+<file path=ppt/notesSlides/notesSlide3.xml><?xml version="1.0" encoding="utf-8"?>
+<p:notes xmlns:a="http://schemas.openxmlformats.org/drawingml/2006/main" xmlns:r="http://schemas.openxmlformats.org/officeDocument/2006/relationships" xmlns:p="http://schemas.openxmlformats.org/presentationml/2006/main">
+  <p:cSld>
+    <p:spTree>
+      <p:nvGrpSpPr>
+        <p:cNvPr id="1" name="">
+          <a:extLst>
+            <a:ext uri="{FF2B5EF4-FFF2-40B4-BE49-F238E27FC236}">
               <a16:creationId xmlns:a16="http://schemas.microsoft.com/office/drawing/2014/main" id="{F1845FCE-36C2-EE51-A3C1-B28D290E51DD}"/>
             </a:ext>
           </a:extLst>
@@ -666,7 +795,7 @@
           <a:p>
             <a:fld id="{4F964865-31C0-4E3C-A8A6-F3E1FD66824B}" type="slidenum">
               <a:rPr lang="en-IN" smtClean="0"/>
-              <a:t>2</a:t>
+              <a:t>3</a:t>
             </a:fld>
             <a:endParaRPr lang="en-IN"/>
           </a:p>
@@ -685,7 +814,7 @@
 </p:notes>
 </file>
 
-<file path=ppt/notesSlides/notesSlide3.xml><?xml version="1.0" encoding="utf-8"?>
+<file path=ppt/notesSlides/notesSlide4.xml><?xml version="1.0" encoding="utf-8"?>
 <p:notes xmlns:a="http://schemas.openxmlformats.org/drawingml/2006/main" xmlns:r="http://schemas.openxmlformats.org/officeDocument/2006/relationships" xmlns:p="http://schemas.openxmlformats.org/presentationml/2006/main">
   <p:cSld>
     <p:spTree>
@@ -789,7 +918,7 @@
           <a:p>
             <a:fld id="{4F964865-31C0-4E3C-A8A6-F3E1FD66824B}" type="slidenum">
               <a:rPr lang="en-IN" smtClean="0"/>
-              <a:t>3</a:t>
+              <a:t>4</a:t>
             </a:fld>
             <a:endParaRPr lang="en-IN"/>
           </a:p>
@@ -808,7 +937,7 @@
 </p:notes>
 </file>
 
-<file path=ppt/notesSlides/notesSlide4.xml><?xml version="1.0" encoding="utf-8"?>
+<file path=ppt/notesSlides/notesSlide5.xml><?xml version="1.0" encoding="utf-8"?>
 <p:notes xmlns:a="http://schemas.openxmlformats.org/drawingml/2006/main" xmlns:r="http://schemas.openxmlformats.org/officeDocument/2006/relationships" xmlns:p="http://schemas.openxmlformats.org/presentationml/2006/main">
   <p:cSld>
     <p:spTree>
@@ -912,7 +1041,7 @@
           <a:p>
             <a:fld id="{4F964865-31C0-4E3C-A8A6-F3E1FD66824B}" type="slidenum">
               <a:rPr lang="en-IN" smtClean="0"/>
-              <a:t>4</a:t>
+              <a:t>5</a:t>
             </a:fld>
             <a:endParaRPr lang="en-IN"/>
           </a:p>
@@ -4557,6 +4686,904 @@
         <p:cNvPr id="1" name="">
           <a:extLst>
             <a:ext uri="{FF2B5EF4-FFF2-40B4-BE49-F238E27FC236}">
+              <a16:creationId xmlns:a16="http://schemas.microsoft.com/office/drawing/2014/main" id="{0F9A76AE-1E51-800D-BBAB-7E4EED618B16}"/>
+            </a:ext>
+          </a:extLst>
+        </p:cNvPr>
+        <p:cNvGrpSpPr/>
+        <p:nvPr/>
+      </p:nvGrpSpPr>
+      <p:grpSpPr>
+        <a:xfrm>
+          <a:off x="0" y="0"/>
+          <a:ext cx="0" cy="0"/>
+          <a:chOff x="0" y="0"/>
+          <a:chExt cx="0" cy="0"/>
+        </a:xfrm>
+      </p:grpSpPr>
+      <p:sp>
+        <p:nvSpPr>
+          <p:cNvPr id="8" name="Rectangle 7">
+            <a:extLst>
+              <a:ext uri="{FF2B5EF4-FFF2-40B4-BE49-F238E27FC236}">
+                <a16:creationId xmlns:a16="http://schemas.microsoft.com/office/drawing/2014/main" id="{67DF6630-51AD-3ADA-AF94-7C33CF8B294E}"/>
+              </a:ext>
+            </a:extLst>
+          </p:cNvPr>
+          <p:cNvSpPr/>
+          <p:nvPr/>
+        </p:nvSpPr>
+        <p:spPr>
+          <a:xfrm>
+            <a:off x="187036" y="1143002"/>
+            <a:ext cx="11814464" cy="935176"/>
+          </a:xfrm>
+          <a:prstGeom prst="rect">
+            <a:avLst/>
+          </a:prstGeom>
+          <a:solidFill>
+            <a:schemeClr val="bg1">
+              <a:alpha val="50000"/>
+            </a:schemeClr>
+          </a:solidFill>
+          <a:ln>
+            <a:noFill/>
+          </a:ln>
+        </p:spPr>
+        <p:style>
+          <a:lnRef idx="2">
+            <a:schemeClr val="accent1">
+              <a:shade val="15000"/>
+            </a:schemeClr>
+          </a:lnRef>
+          <a:fillRef idx="1">
+            <a:schemeClr val="accent1"/>
+          </a:fillRef>
+          <a:effectRef idx="0">
+            <a:schemeClr val="accent1"/>
+          </a:effectRef>
+          <a:fontRef idx="minor">
+            <a:schemeClr val="lt1"/>
+          </a:fontRef>
+        </p:style>
+        <p:txBody>
+          <a:bodyPr rtlCol="0" anchor="ctr"/>
+          <a:lstStyle/>
+          <a:p>
+            <a:pPr algn="ctr"/>
+            <a:endParaRPr lang="en-IN"/>
+          </a:p>
+        </p:txBody>
+      </p:sp>
+      <p:cxnSp>
+        <p:nvCxnSpPr>
+          <p:cNvPr id="10" name="Straight Connector 9">
+            <a:extLst>
+              <a:ext uri="{FF2B5EF4-FFF2-40B4-BE49-F238E27FC236}">
+                <a16:creationId xmlns:a16="http://schemas.microsoft.com/office/drawing/2014/main" id="{465CD3B7-270E-0108-D597-6D92383334DC}"/>
+              </a:ext>
+            </a:extLst>
+          </p:cNvPr>
+          <p:cNvCxnSpPr>
+            <a:cxnSpLocks/>
+          </p:cNvCxnSpPr>
+          <p:nvPr/>
+        </p:nvCxnSpPr>
+        <p:spPr>
+          <a:xfrm>
+            <a:off x="0" y="987136"/>
+            <a:ext cx="12192000" cy="0"/>
+          </a:xfrm>
+          <a:prstGeom prst="line">
+            <a:avLst/>
+          </a:prstGeom>
+          <a:ln>
+            <a:solidFill>
+              <a:srgbClr val="094780"/>
+            </a:solidFill>
+          </a:ln>
+        </p:spPr>
+        <p:style>
+          <a:lnRef idx="2">
+            <a:schemeClr val="accent1"/>
+          </a:lnRef>
+          <a:fillRef idx="0">
+            <a:schemeClr val="accent1"/>
+          </a:fillRef>
+          <a:effectRef idx="1">
+            <a:schemeClr val="accent1"/>
+          </a:effectRef>
+          <a:fontRef idx="minor">
+            <a:schemeClr val="tx1"/>
+          </a:fontRef>
+        </p:style>
+      </p:cxnSp>
+      <p:sp>
+        <p:nvSpPr>
+          <p:cNvPr id="13" name="Rectangle 12">
+            <a:extLst>
+              <a:ext uri="{FF2B5EF4-FFF2-40B4-BE49-F238E27FC236}">
+                <a16:creationId xmlns:a16="http://schemas.microsoft.com/office/drawing/2014/main" id="{0894D6D0-F588-A699-04F0-58AC28CE6757}"/>
+              </a:ext>
+            </a:extLst>
+          </p:cNvPr>
+          <p:cNvSpPr/>
+          <p:nvPr/>
+        </p:nvSpPr>
+        <p:spPr>
+          <a:xfrm>
+            <a:off x="187036" y="3382230"/>
+            <a:ext cx="5789220" cy="1567543"/>
+          </a:xfrm>
+          <a:prstGeom prst="rect">
+            <a:avLst/>
+          </a:prstGeom>
+          <a:solidFill>
+            <a:schemeClr val="bg1">
+              <a:alpha val="50000"/>
+            </a:schemeClr>
+          </a:solidFill>
+          <a:ln>
+            <a:noFill/>
+          </a:ln>
+        </p:spPr>
+        <p:style>
+          <a:lnRef idx="2">
+            <a:schemeClr val="accent1">
+              <a:shade val="15000"/>
+            </a:schemeClr>
+          </a:lnRef>
+          <a:fillRef idx="1">
+            <a:schemeClr val="accent1"/>
+          </a:fillRef>
+          <a:effectRef idx="0">
+            <a:schemeClr val="accent1"/>
+          </a:effectRef>
+          <a:fontRef idx="minor">
+            <a:schemeClr val="lt1"/>
+          </a:fontRef>
+        </p:style>
+        <p:txBody>
+          <a:bodyPr rtlCol="0" anchor="ctr"/>
+          <a:lstStyle/>
+          <a:p>
+            <a:pPr algn="ctr"/>
+            <a:endParaRPr lang="en-IN"/>
+          </a:p>
+        </p:txBody>
+      </p:sp>
+      <p:sp>
+        <p:nvSpPr>
+          <p:cNvPr id="14" name="Rectangle 13">
+            <a:extLst>
+              <a:ext uri="{FF2B5EF4-FFF2-40B4-BE49-F238E27FC236}">
+                <a16:creationId xmlns:a16="http://schemas.microsoft.com/office/drawing/2014/main" id="{058593BC-FD8C-6CEE-9A59-B1BCA3DCEBC1}"/>
+              </a:ext>
+            </a:extLst>
+          </p:cNvPr>
+          <p:cNvSpPr/>
+          <p:nvPr/>
+        </p:nvSpPr>
+        <p:spPr>
+          <a:xfrm>
+            <a:off x="187036" y="2234043"/>
+            <a:ext cx="11814464" cy="935176"/>
+          </a:xfrm>
+          <a:prstGeom prst="rect">
+            <a:avLst/>
+          </a:prstGeom>
+          <a:solidFill>
+            <a:schemeClr val="bg1">
+              <a:alpha val="50000"/>
+            </a:schemeClr>
+          </a:solidFill>
+          <a:ln>
+            <a:noFill/>
+          </a:ln>
+        </p:spPr>
+        <p:style>
+          <a:lnRef idx="2">
+            <a:schemeClr val="accent1">
+              <a:shade val="15000"/>
+            </a:schemeClr>
+          </a:lnRef>
+          <a:fillRef idx="1">
+            <a:schemeClr val="accent1"/>
+          </a:fillRef>
+          <a:effectRef idx="0">
+            <a:schemeClr val="accent1"/>
+          </a:effectRef>
+          <a:fontRef idx="minor">
+            <a:schemeClr val="lt1"/>
+          </a:fontRef>
+        </p:style>
+        <p:txBody>
+          <a:bodyPr rtlCol="0" anchor="ctr"/>
+          <a:lstStyle/>
+          <a:p>
+            <a:pPr algn="ctr"/>
+            <a:endParaRPr lang="en-IN"/>
+          </a:p>
+        </p:txBody>
+      </p:sp>
+      <p:sp>
+        <p:nvSpPr>
+          <p:cNvPr id="15" name="Rectangle 14">
+            <a:extLst>
+              <a:ext uri="{FF2B5EF4-FFF2-40B4-BE49-F238E27FC236}">
+                <a16:creationId xmlns:a16="http://schemas.microsoft.com/office/drawing/2014/main" id="{DE59AF3B-2E65-D2BB-1A88-AAFF64433D35}"/>
+              </a:ext>
+            </a:extLst>
+          </p:cNvPr>
+          <p:cNvSpPr/>
+          <p:nvPr/>
+        </p:nvSpPr>
+        <p:spPr>
+          <a:xfrm>
+            <a:off x="187035" y="5127171"/>
+            <a:ext cx="5789221" cy="1567543"/>
+          </a:xfrm>
+          <a:prstGeom prst="rect">
+            <a:avLst/>
+          </a:prstGeom>
+          <a:solidFill>
+            <a:schemeClr val="bg1">
+              <a:alpha val="50000"/>
+            </a:schemeClr>
+          </a:solidFill>
+          <a:ln>
+            <a:noFill/>
+          </a:ln>
+        </p:spPr>
+        <p:style>
+          <a:lnRef idx="2">
+            <a:schemeClr val="accent1">
+              <a:shade val="15000"/>
+            </a:schemeClr>
+          </a:lnRef>
+          <a:fillRef idx="1">
+            <a:schemeClr val="accent1"/>
+          </a:fillRef>
+          <a:effectRef idx="0">
+            <a:schemeClr val="accent1"/>
+          </a:effectRef>
+          <a:fontRef idx="minor">
+            <a:schemeClr val="lt1"/>
+          </a:fontRef>
+        </p:style>
+        <p:txBody>
+          <a:bodyPr rtlCol="0" anchor="ctr"/>
+          <a:lstStyle/>
+          <a:p>
+            <a:pPr algn="ctr"/>
+            <a:endParaRPr lang="en-IN"/>
+          </a:p>
+        </p:txBody>
+      </p:sp>
+      <p:sp>
+        <p:nvSpPr>
+          <p:cNvPr id="16" name="Rectangle 15">
+            <a:extLst>
+              <a:ext uri="{FF2B5EF4-FFF2-40B4-BE49-F238E27FC236}">
+                <a16:creationId xmlns:a16="http://schemas.microsoft.com/office/drawing/2014/main" id="{D2BF2420-71A4-5F14-4ADC-2D55AFB752FB}"/>
+              </a:ext>
+            </a:extLst>
+          </p:cNvPr>
+          <p:cNvSpPr/>
+          <p:nvPr/>
+        </p:nvSpPr>
+        <p:spPr>
+          <a:xfrm>
+            <a:off x="6215742" y="3382230"/>
+            <a:ext cx="5789221" cy="1567543"/>
+          </a:xfrm>
+          <a:prstGeom prst="rect">
+            <a:avLst/>
+          </a:prstGeom>
+          <a:solidFill>
+            <a:schemeClr val="bg1">
+              <a:alpha val="50000"/>
+            </a:schemeClr>
+          </a:solidFill>
+          <a:ln>
+            <a:noFill/>
+          </a:ln>
+        </p:spPr>
+        <p:style>
+          <a:lnRef idx="2">
+            <a:schemeClr val="accent1">
+              <a:shade val="15000"/>
+            </a:schemeClr>
+          </a:lnRef>
+          <a:fillRef idx="1">
+            <a:schemeClr val="accent1"/>
+          </a:fillRef>
+          <a:effectRef idx="0">
+            <a:schemeClr val="accent1"/>
+          </a:effectRef>
+          <a:fontRef idx="minor">
+            <a:schemeClr val="lt1"/>
+          </a:fontRef>
+        </p:style>
+        <p:txBody>
+          <a:bodyPr rtlCol="0" anchor="ctr"/>
+          <a:lstStyle/>
+          <a:p>
+            <a:pPr algn="ctr"/>
+            <a:endParaRPr lang="en-IN"/>
+          </a:p>
+        </p:txBody>
+      </p:sp>
+      <p:sp>
+        <p:nvSpPr>
+          <p:cNvPr id="17" name="Rectangle 16">
+            <a:extLst>
+              <a:ext uri="{FF2B5EF4-FFF2-40B4-BE49-F238E27FC236}">
+                <a16:creationId xmlns:a16="http://schemas.microsoft.com/office/drawing/2014/main" id="{88B59C48-7526-D497-E585-FB171A919962}"/>
+              </a:ext>
+            </a:extLst>
+          </p:cNvPr>
+          <p:cNvSpPr/>
+          <p:nvPr/>
+        </p:nvSpPr>
+        <p:spPr>
+          <a:xfrm>
+            <a:off x="6215743" y="5127171"/>
+            <a:ext cx="5789221" cy="1567543"/>
+          </a:xfrm>
+          <a:prstGeom prst="rect">
+            <a:avLst/>
+          </a:prstGeom>
+          <a:solidFill>
+            <a:schemeClr val="bg1">
+              <a:alpha val="50000"/>
+            </a:schemeClr>
+          </a:solidFill>
+          <a:ln>
+            <a:noFill/>
+          </a:ln>
+        </p:spPr>
+        <p:style>
+          <a:lnRef idx="2">
+            <a:schemeClr val="accent1">
+              <a:shade val="15000"/>
+            </a:schemeClr>
+          </a:lnRef>
+          <a:fillRef idx="1">
+            <a:schemeClr val="accent1"/>
+          </a:fillRef>
+          <a:effectRef idx="0">
+            <a:schemeClr val="accent1"/>
+          </a:effectRef>
+          <a:fontRef idx="minor">
+            <a:schemeClr val="lt1"/>
+          </a:fontRef>
+        </p:style>
+        <p:txBody>
+          <a:bodyPr rtlCol="0" anchor="ctr"/>
+          <a:lstStyle/>
+          <a:p>
+            <a:pPr algn="ctr"/>
+            <a:endParaRPr lang="en-IN"/>
+          </a:p>
+        </p:txBody>
+      </p:sp>
+      <p:pic>
+        <p:nvPicPr>
+          <p:cNvPr id="3" name="Picture 2" hidden="1">
+            <a:extLst>
+              <a:ext uri="{FF2B5EF4-FFF2-40B4-BE49-F238E27FC236}">
+                <a16:creationId xmlns:a16="http://schemas.microsoft.com/office/drawing/2014/main" id="{C0832AFE-FCC3-E754-7E89-4FEE8A4265AA}"/>
+              </a:ext>
+            </a:extLst>
+          </p:cNvPr>
+          <p:cNvPicPr>
+            <a:picLocks noChangeAspect="1"/>
+          </p:cNvPicPr>
+          <p:nvPr/>
+        </p:nvPicPr>
+        <p:blipFill>
+          <a:blip r:embed="rId3"/>
+          <a:stretch>
+            <a:fillRect/>
+          </a:stretch>
+        </p:blipFill>
+        <p:spPr>
+          <a:xfrm>
+            <a:off x="-1" y="0"/>
+            <a:ext cx="12192000" cy="6858000"/>
+          </a:xfrm>
+          <a:prstGeom prst="rect">
+            <a:avLst/>
+          </a:prstGeom>
+        </p:spPr>
+      </p:pic>
+      <p:cxnSp>
+        <p:nvCxnSpPr>
+          <p:cNvPr id="5" name="Straight Connector 4">
+            <a:extLst>
+              <a:ext uri="{FF2B5EF4-FFF2-40B4-BE49-F238E27FC236}">
+                <a16:creationId xmlns:a16="http://schemas.microsoft.com/office/drawing/2014/main" id="{EE713FDC-109D-042A-B93B-5A88D71C108B}"/>
+              </a:ext>
+            </a:extLst>
+          </p:cNvPr>
+          <p:cNvCxnSpPr>
+            <a:cxnSpLocks/>
+          </p:cNvCxnSpPr>
+          <p:nvPr/>
+        </p:nvCxnSpPr>
+        <p:spPr>
+          <a:xfrm>
+            <a:off x="2400300" y="1309255"/>
+            <a:ext cx="0" cy="602672"/>
+          </a:xfrm>
+          <a:prstGeom prst="line">
+            <a:avLst/>
+          </a:prstGeom>
+          <a:ln w="9525"/>
+        </p:spPr>
+        <p:style>
+          <a:lnRef idx="2">
+            <a:schemeClr val="accent1"/>
+          </a:lnRef>
+          <a:fillRef idx="0">
+            <a:schemeClr val="accent1"/>
+          </a:fillRef>
+          <a:effectRef idx="1">
+            <a:schemeClr val="accent1"/>
+          </a:effectRef>
+          <a:fontRef idx="minor">
+            <a:schemeClr val="tx1"/>
+          </a:fontRef>
+        </p:style>
+      </p:cxnSp>
+      <p:cxnSp>
+        <p:nvCxnSpPr>
+          <p:cNvPr id="9" name="Straight Connector 8">
+            <a:extLst>
+              <a:ext uri="{FF2B5EF4-FFF2-40B4-BE49-F238E27FC236}">
+                <a16:creationId xmlns:a16="http://schemas.microsoft.com/office/drawing/2014/main" id="{7423DBAD-1ABE-4027-2880-A11EDC794441}"/>
+              </a:ext>
+            </a:extLst>
+          </p:cNvPr>
+          <p:cNvCxnSpPr>
+            <a:cxnSpLocks/>
+          </p:cNvCxnSpPr>
+          <p:nvPr/>
+        </p:nvCxnSpPr>
+        <p:spPr>
+          <a:xfrm>
+            <a:off x="9930245" y="1309255"/>
+            <a:ext cx="0" cy="602672"/>
+          </a:xfrm>
+          <a:prstGeom prst="line">
+            <a:avLst/>
+          </a:prstGeom>
+          <a:ln w="9525"/>
+        </p:spPr>
+        <p:style>
+          <a:lnRef idx="2">
+            <a:schemeClr val="accent1"/>
+          </a:lnRef>
+          <a:fillRef idx="0">
+            <a:schemeClr val="accent1"/>
+          </a:fillRef>
+          <a:effectRef idx="1">
+            <a:schemeClr val="accent1"/>
+          </a:effectRef>
+          <a:fontRef idx="minor">
+            <a:schemeClr val="tx1"/>
+          </a:fontRef>
+        </p:style>
+      </p:cxnSp>
+      <p:cxnSp>
+        <p:nvCxnSpPr>
+          <p:cNvPr id="11" name="Straight Connector 10">
+            <a:extLst>
+              <a:ext uri="{FF2B5EF4-FFF2-40B4-BE49-F238E27FC236}">
+                <a16:creationId xmlns:a16="http://schemas.microsoft.com/office/drawing/2014/main" id="{08778FAF-297F-C4FC-2F89-B2BD30290534}"/>
+              </a:ext>
+            </a:extLst>
+          </p:cNvPr>
+          <p:cNvCxnSpPr>
+            <a:cxnSpLocks/>
+          </p:cNvCxnSpPr>
+          <p:nvPr/>
+        </p:nvCxnSpPr>
+        <p:spPr>
+          <a:xfrm>
+            <a:off x="7516091" y="1309255"/>
+            <a:ext cx="0" cy="602672"/>
+          </a:xfrm>
+          <a:prstGeom prst="line">
+            <a:avLst/>
+          </a:prstGeom>
+          <a:ln w="9525"/>
+        </p:spPr>
+        <p:style>
+          <a:lnRef idx="2">
+            <a:schemeClr val="accent1"/>
+          </a:lnRef>
+          <a:fillRef idx="0">
+            <a:schemeClr val="accent1"/>
+          </a:fillRef>
+          <a:effectRef idx="1">
+            <a:schemeClr val="accent1"/>
+          </a:effectRef>
+          <a:fontRef idx="minor">
+            <a:schemeClr val="tx1"/>
+          </a:fontRef>
+        </p:style>
+      </p:cxnSp>
+      <p:cxnSp>
+        <p:nvCxnSpPr>
+          <p:cNvPr id="12" name="Straight Connector 11">
+            <a:extLst>
+              <a:ext uri="{FF2B5EF4-FFF2-40B4-BE49-F238E27FC236}">
+                <a16:creationId xmlns:a16="http://schemas.microsoft.com/office/drawing/2014/main" id="{311DDFE0-B4A7-73D6-7CD2-5963C9E5D6AB}"/>
+              </a:ext>
+            </a:extLst>
+          </p:cNvPr>
+          <p:cNvCxnSpPr>
+            <a:cxnSpLocks/>
+          </p:cNvCxnSpPr>
+          <p:nvPr/>
+        </p:nvCxnSpPr>
+        <p:spPr>
+          <a:xfrm>
+            <a:off x="5018809" y="1309255"/>
+            <a:ext cx="0" cy="602672"/>
+          </a:xfrm>
+          <a:prstGeom prst="line">
+            <a:avLst/>
+          </a:prstGeom>
+          <a:ln w="9525"/>
+        </p:spPr>
+        <p:style>
+          <a:lnRef idx="2">
+            <a:schemeClr val="accent1"/>
+          </a:lnRef>
+          <a:fillRef idx="0">
+            <a:schemeClr val="accent1"/>
+          </a:fillRef>
+          <a:effectRef idx="1">
+            <a:schemeClr val="accent1"/>
+          </a:effectRef>
+          <a:fontRef idx="minor">
+            <a:schemeClr val="tx1"/>
+          </a:fontRef>
+        </p:style>
+      </p:cxnSp>
+      <p:cxnSp>
+        <p:nvCxnSpPr>
+          <p:cNvPr id="18" name="Straight Connector 17">
+            <a:extLst>
+              <a:ext uri="{FF2B5EF4-FFF2-40B4-BE49-F238E27FC236}">
+                <a16:creationId xmlns:a16="http://schemas.microsoft.com/office/drawing/2014/main" id="{583724E6-019E-CBFC-E43B-4BFA2EE9E235}"/>
+              </a:ext>
+            </a:extLst>
+          </p:cNvPr>
+          <p:cNvCxnSpPr>
+            <a:cxnSpLocks/>
+          </p:cNvCxnSpPr>
+          <p:nvPr/>
+        </p:nvCxnSpPr>
+        <p:spPr>
+          <a:xfrm>
+            <a:off x="1524000" y="2386446"/>
+            <a:ext cx="0" cy="602672"/>
+          </a:xfrm>
+          <a:prstGeom prst="line">
+            <a:avLst/>
+          </a:prstGeom>
+          <a:ln w="9525"/>
+        </p:spPr>
+        <p:style>
+          <a:lnRef idx="2">
+            <a:schemeClr val="accent1"/>
+          </a:lnRef>
+          <a:fillRef idx="0">
+            <a:schemeClr val="accent1"/>
+          </a:fillRef>
+          <a:effectRef idx="1">
+            <a:schemeClr val="accent1"/>
+          </a:effectRef>
+          <a:fontRef idx="minor">
+            <a:schemeClr val="tx1"/>
+          </a:fontRef>
+        </p:style>
+      </p:cxnSp>
+      <p:cxnSp>
+        <p:nvCxnSpPr>
+          <p:cNvPr id="20" name="Straight Connector 19">
+            <a:extLst>
+              <a:ext uri="{FF2B5EF4-FFF2-40B4-BE49-F238E27FC236}">
+                <a16:creationId xmlns:a16="http://schemas.microsoft.com/office/drawing/2014/main" id="{5F7CA2C7-CA88-C7C3-F7FC-0FC6D46AE646}"/>
+              </a:ext>
+            </a:extLst>
+          </p:cNvPr>
+          <p:cNvCxnSpPr>
+            <a:cxnSpLocks/>
+          </p:cNvCxnSpPr>
+          <p:nvPr/>
+        </p:nvCxnSpPr>
+        <p:spPr>
+          <a:xfrm>
+            <a:off x="5976256" y="2386446"/>
+            <a:ext cx="0" cy="602672"/>
+          </a:xfrm>
+          <a:prstGeom prst="line">
+            <a:avLst/>
+          </a:prstGeom>
+          <a:ln w="9525"/>
+        </p:spPr>
+        <p:style>
+          <a:lnRef idx="2">
+            <a:schemeClr val="accent1"/>
+          </a:lnRef>
+          <a:fillRef idx="0">
+            <a:schemeClr val="accent1"/>
+          </a:fillRef>
+          <a:effectRef idx="1">
+            <a:schemeClr val="accent1"/>
+          </a:effectRef>
+          <a:fontRef idx="minor">
+            <a:schemeClr val="tx1"/>
+          </a:fontRef>
+        </p:style>
+      </p:cxnSp>
+      <p:cxnSp>
+        <p:nvCxnSpPr>
+          <p:cNvPr id="21" name="Straight Connector 20">
+            <a:extLst>
+              <a:ext uri="{FF2B5EF4-FFF2-40B4-BE49-F238E27FC236}">
+                <a16:creationId xmlns:a16="http://schemas.microsoft.com/office/drawing/2014/main" id="{BDE81B02-9EF0-035E-08C9-95ED3FDE503A}"/>
+              </a:ext>
+            </a:extLst>
+          </p:cNvPr>
+          <p:cNvCxnSpPr>
+            <a:cxnSpLocks/>
+          </p:cNvCxnSpPr>
+          <p:nvPr/>
+        </p:nvCxnSpPr>
+        <p:spPr>
+          <a:xfrm>
+            <a:off x="4343400" y="2386446"/>
+            <a:ext cx="0" cy="602672"/>
+          </a:xfrm>
+          <a:prstGeom prst="line">
+            <a:avLst/>
+          </a:prstGeom>
+          <a:ln w="9525"/>
+        </p:spPr>
+        <p:style>
+          <a:lnRef idx="2">
+            <a:schemeClr val="accent1"/>
+          </a:lnRef>
+          <a:fillRef idx="0">
+            <a:schemeClr val="accent1"/>
+          </a:fillRef>
+          <a:effectRef idx="1">
+            <a:schemeClr val="accent1"/>
+          </a:effectRef>
+          <a:fontRef idx="minor">
+            <a:schemeClr val="tx1"/>
+          </a:fontRef>
+        </p:style>
+      </p:cxnSp>
+      <p:cxnSp>
+        <p:nvCxnSpPr>
+          <p:cNvPr id="22" name="Straight Connector 21">
+            <a:extLst>
+              <a:ext uri="{FF2B5EF4-FFF2-40B4-BE49-F238E27FC236}">
+                <a16:creationId xmlns:a16="http://schemas.microsoft.com/office/drawing/2014/main" id="{F741FE41-DAFC-297B-A175-A986AB59488E}"/>
+              </a:ext>
+            </a:extLst>
+          </p:cNvPr>
+          <p:cNvCxnSpPr>
+            <a:cxnSpLocks/>
+          </p:cNvCxnSpPr>
+          <p:nvPr/>
+        </p:nvCxnSpPr>
+        <p:spPr>
+          <a:xfrm>
+            <a:off x="2874818" y="2389910"/>
+            <a:ext cx="0" cy="602672"/>
+          </a:xfrm>
+          <a:prstGeom prst="line">
+            <a:avLst/>
+          </a:prstGeom>
+          <a:ln w="9525"/>
+        </p:spPr>
+        <p:style>
+          <a:lnRef idx="2">
+            <a:schemeClr val="accent1"/>
+          </a:lnRef>
+          <a:fillRef idx="0">
+            <a:schemeClr val="accent1"/>
+          </a:fillRef>
+          <a:effectRef idx="1">
+            <a:schemeClr val="accent1"/>
+          </a:effectRef>
+          <a:fontRef idx="minor">
+            <a:schemeClr val="tx1"/>
+          </a:fontRef>
+        </p:style>
+      </p:cxnSp>
+      <p:cxnSp>
+        <p:nvCxnSpPr>
+          <p:cNvPr id="23" name="Straight Connector 22">
+            <a:extLst>
+              <a:ext uri="{FF2B5EF4-FFF2-40B4-BE49-F238E27FC236}">
+                <a16:creationId xmlns:a16="http://schemas.microsoft.com/office/drawing/2014/main" id="{464342AF-ED39-4FA7-FE38-D80923A9B3A7}"/>
+              </a:ext>
+            </a:extLst>
+          </p:cNvPr>
+          <p:cNvCxnSpPr>
+            <a:cxnSpLocks/>
+          </p:cNvCxnSpPr>
+          <p:nvPr/>
+        </p:nvCxnSpPr>
+        <p:spPr>
+          <a:xfrm>
+            <a:off x="10622972" y="2386446"/>
+            <a:ext cx="0" cy="602672"/>
+          </a:xfrm>
+          <a:prstGeom prst="line">
+            <a:avLst/>
+          </a:prstGeom>
+          <a:ln w="9525"/>
+        </p:spPr>
+        <p:style>
+          <a:lnRef idx="2">
+            <a:schemeClr val="accent1"/>
+          </a:lnRef>
+          <a:fillRef idx="0">
+            <a:schemeClr val="accent1"/>
+          </a:fillRef>
+          <a:effectRef idx="1">
+            <a:schemeClr val="accent1"/>
+          </a:effectRef>
+          <a:fontRef idx="minor">
+            <a:schemeClr val="tx1"/>
+          </a:fontRef>
+        </p:style>
+      </p:cxnSp>
+      <p:cxnSp>
+        <p:nvCxnSpPr>
+          <p:cNvPr id="24" name="Straight Connector 23">
+            <a:extLst>
+              <a:ext uri="{FF2B5EF4-FFF2-40B4-BE49-F238E27FC236}">
+                <a16:creationId xmlns:a16="http://schemas.microsoft.com/office/drawing/2014/main" id="{3A771DF4-230B-70FF-1E49-02DA735B1FB8}"/>
+              </a:ext>
+            </a:extLst>
+          </p:cNvPr>
+          <p:cNvCxnSpPr>
+            <a:cxnSpLocks/>
+          </p:cNvCxnSpPr>
+          <p:nvPr/>
+        </p:nvCxnSpPr>
+        <p:spPr>
+          <a:xfrm>
+            <a:off x="9071263" y="2386446"/>
+            <a:ext cx="0" cy="602672"/>
+          </a:xfrm>
+          <a:prstGeom prst="line">
+            <a:avLst/>
+          </a:prstGeom>
+          <a:ln w="9525"/>
+        </p:spPr>
+        <p:style>
+          <a:lnRef idx="2">
+            <a:schemeClr val="accent1"/>
+          </a:lnRef>
+          <a:fillRef idx="0">
+            <a:schemeClr val="accent1"/>
+          </a:fillRef>
+          <a:effectRef idx="1">
+            <a:schemeClr val="accent1"/>
+          </a:effectRef>
+          <a:fontRef idx="minor">
+            <a:schemeClr val="tx1"/>
+          </a:fontRef>
+        </p:style>
+      </p:cxnSp>
+      <p:cxnSp>
+        <p:nvCxnSpPr>
+          <p:cNvPr id="25" name="Straight Connector 24">
+            <a:extLst>
+              <a:ext uri="{FF2B5EF4-FFF2-40B4-BE49-F238E27FC236}">
+                <a16:creationId xmlns:a16="http://schemas.microsoft.com/office/drawing/2014/main" id="{12BDC677-83F5-50E2-2421-3CDB20A92431}"/>
+              </a:ext>
+            </a:extLst>
+          </p:cNvPr>
+          <p:cNvCxnSpPr>
+            <a:cxnSpLocks/>
+          </p:cNvCxnSpPr>
+          <p:nvPr/>
+        </p:nvCxnSpPr>
+        <p:spPr>
+          <a:xfrm>
+            <a:off x="7443355" y="2386446"/>
+            <a:ext cx="0" cy="602672"/>
+          </a:xfrm>
+          <a:prstGeom prst="line">
+            <a:avLst/>
+          </a:prstGeom>
+          <a:ln w="9525"/>
+        </p:spPr>
+        <p:style>
+          <a:lnRef idx="2">
+            <a:schemeClr val="accent1"/>
+          </a:lnRef>
+          <a:fillRef idx="0">
+            <a:schemeClr val="accent1"/>
+          </a:fillRef>
+          <a:effectRef idx="1">
+            <a:schemeClr val="accent1"/>
+          </a:effectRef>
+          <a:fontRef idx="minor">
+            <a:schemeClr val="tx1"/>
+          </a:fontRef>
+        </p:style>
+      </p:cxnSp>
+      <p:pic>
+        <p:nvPicPr>
+          <p:cNvPr id="27" name="Graphic 26">
+            <a:extLst>
+              <a:ext uri="{FF2B5EF4-FFF2-40B4-BE49-F238E27FC236}">
+                <a16:creationId xmlns:a16="http://schemas.microsoft.com/office/drawing/2014/main" id="{29AEDB4B-FC70-5B85-5ED1-3398F0F64EFD}"/>
+              </a:ext>
+            </a:extLst>
+          </p:cNvPr>
+          <p:cNvPicPr>
+            <a:picLocks noChangeAspect="1"/>
+          </p:cNvPicPr>
+          <p:nvPr/>
+        </p:nvPicPr>
+        <p:blipFill>
+          <a:blip r:embed="rId4">
+            <a:extLst>
+              <a:ext uri="{96DAC541-7B7A-43D3-8B79-37D633B846F1}">
+                <asvg:svgBlip xmlns:asvg="http://schemas.microsoft.com/office/drawing/2016/SVG/main" r:embed="rId5"/>
+              </a:ext>
+            </a:extLst>
+          </a:blip>
+          <a:stretch>
+            <a:fillRect/>
+          </a:stretch>
+        </p:blipFill>
+        <p:spPr>
+          <a:xfrm>
+            <a:off x="124694" y="62344"/>
+            <a:ext cx="1091044" cy="846865"/>
+          </a:xfrm>
+          <a:prstGeom prst="rect">
+            <a:avLst/>
+          </a:prstGeom>
+        </p:spPr>
+      </p:pic>
+    </p:spTree>
+    <p:extLst>
+      <p:ext uri="{BB962C8B-B14F-4D97-AF65-F5344CB8AC3E}">
+        <p14:creationId xmlns:p14="http://schemas.microsoft.com/office/powerpoint/2010/main" val="2517691278"/>
+      </p:ext>
+    </p:extLst>
+  </p:cSld>
+  <p:clrMapOvr>
+    <a:masterClrMapping/>
+  </p:clrMapOvr>
+</p:sld>
+</file>
+
+<file path=ppt/slides/slide3.xml><?xml version="1.0" encoding="utf-8"?>
+<p:sld xmlns:a="http://schemas.openxmlformats.org/drawingml/2006/main" xmlns:r="http://schemas.openxmlformats.org/officeDocument/2006/relationships" xmlns:p="http://schemas.openxmlformats.org/presentationml/2006/main">
+  <p:cSld>
+    <p:spTree>
+      <p:nvGrpSpPr>
+        <p:cNvPr id="1" name="">
+          <a:extLst>
+            <a:ext uri="{FF2B5EF4-FFF2-40B4-BE49-F238E27FC236}">
               <a16:creationId xmlns:a16="http://schemas.microsoft.com/office/drawing/2014/main" id="{6ED2ABCA-BD3C-449D-0933-435F32FF4546}"/>
             </a:ext>
           </a:extLst>
@@ -4952,7 +5979,7 @@
 </p:sld>
 </file>
 
-<file path=ppt/slides/slide3.xml><?xml version="1.0" encoding="utf-8"?>
+<file path=ppt/slides/slide4.xml><?xml version="1.0" encoding="utf-8"?>
 <p:sld xmlns:a="http://schemas.openxmlformats.org/drawingml/2006/main" xmlns:r="http://schemas.openxmlformats.org/officeDocument/2006/relationships" xmlns:p="http://schemas.openxmlformats.org/presentationml/2006/main">
   <p:cSld>
     <p:spTree>
@@ -5517,7 +6544,7 @@
 </p:sld>
 </file>
 
-<file path=ppt/slides/slide4.xml><?xml version="1.0" encoding="utf-8"?>
+<file path=ppt/slides/slide5.xml><?xml version="1.0" encoding="utf-8"?>
 <p:sld xmlns:a="http://schemas.openxmlformats.org/drawingml/2006/main" xmlns:r="http://schemas.openxmlformats.org/officeDocument/2006/relationships" xmlns:p="http://schemas.openxmlformats.org/presentationml/2006/main">
   <p:cSld>
     <p:spTree>

</xml_diff>